<commit_message>
subindo apresentacao lab2 corrigida
</commit_message>
<xml_diff>
--- a/Lab02/apresentacao/apresentacao_lab02.pptx
+++ b/Lab02/apresentacao/apresentacao_lab02.pptx
@@ -4996,38 +4996,9 @@
           <a:chExt cx="0" cy="0"/>
         </a:xfrm>
       </p:grpSpPr>
-      <p:pic>
-        <p:nvPicPr>
-          <p:cNvPr id="175" name="Angular stone architecture in light and shadow" descr="Angular stone architecture in light and shadow"/>
-          <p:cNvPicPr>
-            <a:picLocks noChangeAspect="1"/>
-          </p:cNvPicPr>
-          <p:nvPr>
-            <p:ph type="pic" idx="22"/>
-          </p:nvPr>
-        </p:nvPicPr>
-        <p:blipFill>
-          <a:blip r:embed="rId2">
-            <a:extLst/>
-          </a:blip>
-          <a:srcRect l="28125" t="0" r="28125" b="0"/>
-          <a:stretch>
-            <a:fillRect/>
-          </a:stretch>
-        </p:blipFill>
-        <p:spPr>
-          <a:xfrm>
-            <a:off x="12382500" y="0"/>
-            <a:ext cx="12001381" cy="13716001"/>
-          </a:xfrm>
-          <a:prstGeom prst="rect">
-            <a:avLst/>
-          </a:prstGeom>
-        </p:spPr>
-      </p:pic>
       <p:sp>
         <p:nvSpPr>
-          <p:cNvPr id="176" name="Tecnologias Utilizadas"/>
+          <p:cNvPr id="175" name="Questões de Pesquisa"/>
           <p:cNvSpPr txBox="1"/>
           <p:nvPr>
             <p:ph type="title"/>
@@ -5041,31 +5012,27 @@
         <p:txBody>
           <a:bodyPr/>
           <a:lstStyle>
-            <a:lvl1pPr defTabSz="1828754">
-              <a:defRPr spc="-75" sz="7500"/>
+            <a:lvl1pPr defTabSz="2316421">
+              <a:defRPr spc="-95" sz="9500"/>
             </a:lvl1pPr>
           </a:lstStyle>
           <a:p>
             <a:pPr/>
             <a:r>
-              <a:t>Tecnologias Utilizadas</a:t>
+              <a:t>Questões de Pesquisa</a:t>
             </a:r>
           </a:p>
         </p:txBody>
       </p:sp>
       <p:sp>
         <p:nvSpPr>
-          <p:cNvPr id="177" name="Python…"/>
+          <p:cNvPr id="176" name="Qual é a relação entre a popularidade dos repositórios e suas características de qualidade?…"/>
           <p:cNvSpPr txBox="1"/>
           <p:nvPr>
-            <p:ph type="body" sz="half" idx="1"/>
+            <p:ph type="body" idx="1"/>
           </p:nvPr>
         </p:nvSpPr>
         <p:spPr>
-          <a:xfrm>
-            <a:off x="1206500" y="2729685"/>
-            <a:ext cx="9779000" cy="10534411"/>
-          </a:xfrm>
           <a:prstGeom prst="rect">
             <a:avLst/>
           </a:prstGeom>
@@ -5076,87 +5043,29 @@
           <a:p>
             <a:pPr/>
             <a:r>
-              <a:t>Python</a:t>
-            </a:r>
-          </a:p>
-          <a:p>
-            <a:pPr lvl="1"/>
-            <a:r>
-              <a:t>Bibliotecas: Requests; CSV; DateTime; Pandas; Matplotlib; Seaborn; ScyPy; </a:t>
+              <a:t>Qual é a relação entre a popularidade dos repositórios e suas características de qualidade?</a:t>
             </a:r>
           </a:p>
           <a:p>
             <a:pPr/>
             <a:r>
-              <a:t>API GraphQL do GitHub</a:t>
+              <a:t>Qual é a relação entre a maturidade dos repositórios e suas características de qualidade?</a:t>
             </a:r>
           </a:p>
           <a:p>
             <a:pPr/>
             <a:r>
-              <a:t>Visual Studio Code</a:t>
+              <a:t>Qual é a relação entre a atividade dos repositórios e suas características de qualidade?</a:t>
+            </a:r>
+          </a:p>
+          <a:p>
+            <a:pPr/>
+            <a:r>
+              <a:t>Qual é a relação entre o tamanho dos repositórios e suas características de qualidade?</a:t>
             </a:r>
           </a:p>
         </p:txBody>
       </p:sp>
-      <p:pic>
-        <p:nvPicPr>
-          <p:cNvPr id="178" name="python-logo.png" descr="python-logo.png"/>
-          <p:cNvPicPr>
-            <a:picLocks noChangeAspect="1"/>
-          </p:cNvPicPr>
-          <p:nvPr/>
-        </p:nvPicPr>
-        <p:blipFill>
-          <a:blip r:embed="rId3">
-            <a:extLst/>
-          </a:blip>
-          <a:stretch>
-            <a:fillRect/>
-          </a:stretch>
-        </p:blipFill>
-        <p:spPr>
-          <a:xfrm>
-            <a:off x="14700250" y="803473"/>
-            <a:ext cx="7366000" cy="2082801"/>
-          </a:xfrm>
-          <a:prstGeom prst="rect">
-            <a:avLst/>
-          </a:prstGeom>
-          <a:ln w="12700">
-            <a:miter lim="400000"/>
-          </a:ln>
-        </p:spPr>
-      </p:pic>
-      <p:pic>
-        <p:nvPicPr>
-          <p:cNvPr id="179" name="Visual_Studio_Code_1.35_icon.svg.png" descr="Visual_Studio_Code_1.35_icon.svg.png"/>
-          <p:cNvPicPr>
-            <a:picLocks noChangeAspect="1"/>
-          </p:cNvPicPr>
-          <p:nvPr/>
-        </p:nvPicPr>
-        <p:blipFill>
-          <a:blip r:embed="rId4">
-            <a:extLst/>
-          </a:blip>
-          <a:stretch>
-            <a:fillRect/>
-          </a:stretch>
-        </p:blipFill>
-        <p:spPr>
-          <a:xfrm>
-            <a:off x="16948126" y="10072224"/>
-            <a:ext cx="2863401" cy="2863401"/>
-          </a:xfrm>
-          <a:prstGeom prst="rect">
-            <a:avLst/>
-          </a:prstGeom>
-          <a:ln w="12700">
-            <a:miter lim="400000"/>
-          </a:ln>
-        </p:spPr>
-      </p:pic>
     </p:spTree>
   </p:cSld>
   <p:clrMapOvr>
@@ -5459,7 +5368,7 @@
               <a:defRPr spc="-63" sz="6360"/>
             </a:pPr>
             <a:r>
-              <a:t>Existe relação entre a atividade e a qualidade dos repositórios analisados</a:t>
+              <a:t>Não existe relação entre a atividade e a qualidade dos repositórios analisados</a:t>
             </a:r>
           </a:p>
         </p:txBody>
@@ -5540,9 +5449,38 @@
           <a:chExt cx="0" cy="0"/>
         </a:xfrm>
       </p:grpSpPr>
+      <p:pic>
+        <p:nvPicPr>
+          <p:cNvPr id="178" name="Angular stone architecture in light and shadow" descr="Angular stone architecture in light and shadow"/>
+          <p:cNvPicPr>
+            <a:picLocks noChangeAspect="1"/>
+          </p:cNvPicPr>
+          <p:nvPr>
+            <p:ph type="pic" idx="22"/>
+          </p:nvPr>
+        </p:nvPicPr>
+        <p:blipFill>
+          <a:blip r:embed="rId2">
+            <a:extLst/>
+          </a:blip>
+          <a:srcRect l="28125" t="0" r="28125" b="0"/>
+          <a:stretch>
+            <a:fillRect/>
+          </a:stretch>
+        </p:blipFill>
+        <p:spPr>
+          <a:xfrm>
+            <a:off x="12382500" y="0"/>
+            <a:ext cx="12001381" cy="13716001"/>
+          </a:xfrm>
+          <a:prstGeom prst="rect">
+            <a:avLst/>
+          </a:prstGeom>
+        </p:spPr>
+      </p:pic>
       <p:sp>
         <p:nvSpPr>
-          <p:cNvPr id="181" name="Questões de Pesquisa"/>
+          <p:cNvPr id="179" name="Tecnologias Utilizadas"/>
           <p:cNvSpPr txBox="1"/>
           <p:nvPr>
             <p:ph type="title"/>
@@ -5556,27 +5494,31 @@
         <p:txBody>
           <a:bodyPr/>
           <a:lstStyle>
-            <a:lvl1pPr defTabSz="2316421">
-              <a:defRPr spc="-95" sz="9500"/>
+            <a:lvl1pPr defTabSz="1828754">
+              <a:defRPr spc="-75" sz="7500"/>
             </a:lvl1pPr>
           </a:lstStyle>
           <a:p>
             <a:pPr/>
             <a:r>
-              <a:t>Questões de Pesquisa</a:t>
+              <a:t>Tecnologias Utilizadas</a:t>
             </a:r>
           </a:p>
         </p:txBody>
       </p:sp>
       <p:sp>
         <p:nvSpPr>
-          <p:cNvPr id="182" name="Qual é a relação entre a popularidade dos repositórios e suas características de qualidade?…"/>
+          <p:cNvPr id="180" name="Python…"/>
           <p:cNvSpPr txBox="1"/>
           <p:nvPr>
-            <p:ph type="body" idx="1"/>
+            <p:ph type="body" sz="half" idx="1"/>
           </p:nvPr>
         </p:nvSpPr>
         <p:spPr>
+          <a:xfrm>
+            <a:off x="1206500" y="2729685"/>
+            <a:ext cx="9779000" cy="10534411"/>
+          </a:xfrm>
           <a:prstGeom prst="rect">
             <a:avLst/>
           </a:prstGeom>
@@ -5587,29 +5529,93 @@
           <a:p>
             <a:pPr/>
             <a:r>
-              <a:t>Qual é a relação entre a popularidade dos repositórios e suas características de qualidade?</a:t>
+              <a:t>Python</a:t>
+            </a:r>
+          </a:p>
+          <a:p>
+            <a:pPr lvl="1"/>
+            <a:r>
+              <a:t>Bibliotecas: Requests; CSV; DateTime; Pandas; Matplotlib; Seaborn; ScyPy; </a:t>
             </a:r>
           </a:p>
           <a:p>
             <a:pPr/>
             <a:r>
-              <a:t>Qual é a relação entre a maturidade dos repositórios e suas características de qualidade?</a:t>
+              <a:t>ck</a:t>
             </a:r>
           </a:p>
           <a:p>
             <a:pPr/>
             <a:r>
-              <a:t>Qual é a relação entre a atividade dos repositórios e suas características de qualidade?</a:t>
+              <a:t>API GraphQL do GitHub</a:t>
             </a:r>
           </a:p>
           <a:p>
             <a:pPr/>
             <a:r>
-              <a:t>Qual é a relação entre o tamanho dos repositórios e suas características de qualidade?</a:t>
+              <a:t>Visual Studio Code</a:t>
             </a:r>
           </a:p>
         </p:txBody>
       </p:sp>
+      <p:pic>
+        <p:nvPicPr>
+          <p:cNvPr id="181" name="python-logo.png" descr="python-logo.png"/>
+          <p:cNvPicPr>
+            <a:picLocks noChangeAspect="1"/>
+          </p:cNvPicPr>
+          <p:nvPr/>
+        </p:nvPicPr>
+        <p:blipFill>
+          <a:blip r:embed="rId3">
+            <a:extLst/>
+          </a:blip>
+          <a:stretch>
+            <a:fillRect/>
+          </a:stretch>
+        </p:blipFill>
+        <p:spPr>
+          <a:xfrm>
+            <a:off x="14700250" y="803473"/>
+            <a:ext cx="7366000" cy="2082801"/>
+          </a:xfrm>
+          <a:prstGeom prst="rect">
+            <a:avLst/>
+          </a:prstGeom>
+          <a:ln w="12700">
+            <a:miter lim="400000"/>
+          </a:ln>
+        </p:spPr>
+      </p:pic>
+      <p:pic>
+        <p:nvPicPr>
+          <p:cNvPr id="182" name="Visual_Studio_Code_1.35_icon.svg.png" descr="Visual_Studio_Code_1.35_icon.svg.png"/>
+          <p:cNvPicPr>
+            <a:picLocks noChangeAspect="1"/>
+          </p:cNvPicPr>
+          <p:nvPr/>
+        </p:nvPicPr>
+        <p:blipFill>
+          <a:blip r:embed="rId4">
+            <a:extLst/>
+          </a:blip>
+          <a:stretch>
+            <a:fillRect/>
+          </a:stretch>
+        </p:blipFill>
+        <p:spPr>
+          <a:xfrm>
+            <a:off x="16948126" y="10072224"/>
+            <a:ext cx="2863401" cy="2863401"/>
+          </a:xfrm>
+          <a:prstGeom prst="rect">
+            <a:avLst/>
+          </a:prstGeom>
+          <a:ln w="12700">
+            <a:miter lim="400000"/>
+          </a:ln>
+        </p:spPr>
+      </p:pic>
     </p:spTree>
   </p:cSld>
   <p:clrMapOvr>

</xml_diff>